<commit_message>
update 12 Jan 16
</commit_message>
<xml_diff>
--- a/Crotty2015/report20150909.pptx
+++ b/Crotty2015/report20150909.pptx
@@ -12,10 +12,10 @@
     <p:sldMasterId id="2147484079" r:id="rId8"/>
   </p:sldMasterIdLst>
   <p:notesMasterIdLst>
-    <p:notesMasterId r:id="rId18"/>
+    <p:notesMasterId r:id="rId20"/>
   </p:notesMasterIdLst>
   <p:handoutMasterIdLst>
-    <p:handoutMasterId r:id="rId19"/>
+    <p:handoutMasterId r:id="rId21"/>
   </p:handoutMasterIdLst>
   <p:sldIdLst>
     <p:sldId id="256" r:id="rId9"/>
@@ -27,6 +27,8 @@
     <p:sldId id="263" r:id="rId15"/>
     <p:sldId id="262" r:id="rId16"/>
     <p:sldId id="264" r:id="rId17"/>
+    <p:sldId id="265" r:id="rId18"/>
+    <p:sldId id="266" r:id="rId19"/>
   </p:sldIdLst>
   <p:sldSz cx="9144000" cy="5143500" type="screen16x9"/>
   <p:notesSz cx="6858000" cy="9144000"/>
@@ -211,7 +213,7 @@
             <a:fld id="{F580C841-A34D-0F44-B99C-434D0D484263}" type="datetimeFigureOut">
               <a:rPr lang="en-US" smtClean="0"/>
               <a:pPr/>
-              <a:t>9/9/15</a:t>
+              <a:t>1/12/16</a:t>
             </a:fld>
             <a:endParaRPr lang="en-US"/>
           </a:p>
@@ -379,7 +381,7 @@
             <a:fld id="{D55F55D3-CD27-9042-95C4-4762BDC1F504}" type="datetimeFigureOut">
               <a:rPr lang="en-US" smtClean="0"/>
               <a:pPr/>
-              <a:t>9/9/15</a:t>
+              <a:t>1/12/16</a:t>
             </a:fld>
             <a:endParaRPr lang="en-US"/>
           </a:p>
@@ -25015,11 +25017,7 @@
           <a:p>
             <a:r>
               <a:rPr lang="en-US" dirty="0" smtClean="0"/>
-              <a:t>TFH </a:t>
-            </a:r>
-            <a:r>
-              <a:rPr lang="en-US" dirty="0" smtClean="0"/>
-              <a:t>paper</a:t>
+              <a:t>TFH paper</a:t>
             </a:r>
             <a:endParaRPr lang="en-US" dirty="0"/>
           </a:p>
@@ -25048,6 +25046,449 @@
     <p:extLst>
       <p:ext uri="{BB962C8B-B14F-4D97-AF65-F5344CB8AC3E}">
         <p14:creationId xmlns:p14="http://schemas.microsoft.com/office/powerpoint/2010/main" val="3166900812"/>
+      </p:ext>
+    </p:extLst>
+  </p:cSld>
+  <p:clrMapOvr>
+    <a:masterClrMapping/>
+  </p:clrMapOvr>
+</p:sld>
+</file>
+
+<file path=ppt/slides/slide10.xml><?xml version="1.0" encoding="utf-8"?>
+<p:sld xmlns:a="http://schemas.openxmlformats.org/drawingml/2006/main" xmlns:r="http://schemas.openxmlformats.org/officeDocument/2006/relationships" xmlns:p="http://schemas.openxmlformats.org/presentationml/2006/main">
+  <p:cSld>
+    <p:spTree>
+      <p:nvGrpSpPr>
+        <p:cNvPr id="1" name=""/>
+        <p:cNvGrpSpPr/>
+        <p:nvPr/>
+      </p:nvGrpSpPr>
+      <p:grpSpPr>
+        <a:xfrm>
+          <a:off x="0" y="0"/>
+          <a:ext cx="0" cy="0"/>
+          <a:chOff x="0" y="0"/>
+          <a:chExt cx="0" cy="0"/>
+        </a:xfrm>
+      </p:grpSpPr>
+      <p:pic>
+        <p:nvPicPr>
+          <p:cNvPr id="3" name="Picture 2" descr="venn_NN.png"/>
+          <p:cNvPicPr>
+            <a:picLocks noChangeAspect="1"/>
+          </p:cNvPicPr>
+          <p:nvPr/>
+        </p:nvPicPr>
+        <p:blipFill rotWithShape="1">
+          <a:blip r:embed="rId2">
+            <a:extLst>
+              <a:ext uri="{28A0092B-C50C-407E-A947-70E740481C1C}">
+                <a14:useLocalDpi xmlns:a14="http://schemas.microsoft.com/office/drawing/2010/main" val="0"/>
+              </a:ext>
+            </a:extLst>
+          </a:blip>
+          <a:srcRect t="22071"/>
+          <a:stretch/>
+        </p:blipFill>
+        <p:spPr>
+          <a:xfrm>
+            <a:off x="555223" y="76968"/>
+            <a:ext cx="3481469" cy="2713055"/>
+          </a:xfrm>
+          <a:prstGeom prst="rect">
+            <a:avLst/>
+          </a:prstGeom>
+        </p:spPr>
+      </p:pic>
+      <p:pic>
+        <p:nvPicPr>
+          <p:cNvPr id="4" name="Picture 3" descr="venn_NP.png"/>
+          <p:cNvPicPr>
+            <a:picLocks noChangeAspect="1"/>
+          </p:cNvPicPr>
+          <p:nvPr/>
+        </p:nvPicPr>
+        <p:blipFill rotWithShape="1">
+          <a:blip r:embed="rId3">
+            <a:extLst>
+              <a:ext uri="{28A0092B-C50C-407E-A947-70E740481C1C}">
+                <a14:useLocalDpi xmlns:a14="http://schemas.microsoft.com/office/drawing/2010/main" val="0"/>
+              </a:ext>
+            </a:extLst>
+          </a:blip>
+          <a:srcRect t="24877"/>
+          <a:stretch/>
+        </p:blipFill>
+        <p:spPr>
+          <a:xfrm>
+            <a:off x="2546510" y="2077125"/>
+            <a:ext cx="3165818" cy="2378250"/>
+          </a:xfrm>
+          <a:prstGeom prst="rect">
+            <a:avLst/>
+          </a:prstGeom>
+        </p:spPr>
+      </p:pic>
+      <p:pic>
+        <p:nvPicPr>
+          <p:cNvPr id="5" name="Picture 4" descr="venn_PP.png"/>
+          <p:cNvPicPr>
+            <a:picLocks noChangeAspect="1"/>
+          </p:cNvPicPr>
+          <p:nvPr/>
+        </p:nvPicPr>
+        <p:blipFill rotWithShape="1">
+          <a:blip r:embed="rId4">
+            <a:extLst>
+              <a:ext uri="{28A0092B-C50C-407E-A947-70E740481C1C}">
+                <a14:useLocalDpi xmlns:a14="http://schemas.microsoft.com/office/drawing/2010/main" val="0"/>
+              </a:ext>
+            </a:extLst>
+          </a:blip>
+          <a:srcRect t="24690" b="21253"/>
+          <a:stretch/>
+        </p:blipFill>
+        <p:spPr>
+          <a:xfrm>
+            <a:off x="5616113" y="3266250"/>
+            <a:ext cx="3185767" cy="1722117"/>
+          </a:xfrm>
+          <a:prstGeom prst="rect">
+            <a:avLst/>
+          </a:prstGeom>
+        </p:spPr>
+      </p:pic>
+      <p:sp>
+        <p:nvSpPr>
+          <p:cNvPr id="6" name="Rectangle 5"/>
+          <p:cNvSpPr/>
+          <p:nvPr/>
+        </p:nvSpPr>
+        <p:spPr>
+          <a:xfrm>
+            <a:off x="852401" y="3906691"/>
+            <a:ext cx="4572000" cy="646331"/>
+          </a:xfrm>
+          <a:prstGeom prst="rect">
+            <a:avLst/>
+          </a:prstGeom>
+        </p:spPr>
+        <p:txBody>
+          <a:bodyPr>
+            <a:spAutoFit/>
+          </a:bodyPr>
+          <a:lstStyle/>
+          <a:p>
+            <a:r>
+              <a:rPr lang="en-US" sz="1200" dirty="0" smtClean="0">
+                <a:solidFill>
+                  <a:srgbClr val="FF0000"/>
+                </a:solidFill>
+              </a:rPr>
+              <a:t>TH1 and PP overlaps</a:t>
+            </a:r>
+          </a:p>
+          <a:p>
+            <a:r>
+              <a:rPr lang="en-US" sz="1200" dirty="0" smtClean="0"/>
+              <a:t>Capn2, Ccdc12, Cdc25b, Dnase1l1, Fkbp1a, Gng2, Il10ra, Itga4, </a:t>
+            </a:r>
+            <a:r>
+              <a:rPr lang="en-US" sz="1200" dirty="0" err="1" smtClean="0"/>
+              <a:t>Maf</a:t>
+            </a:r>
+            <a:r>
+              <a:rPr lang="en-US" sz="1200" dirty="0" smtClean="0"/>
+              <a:t>, Mical1, Myo1g, Ppil1, Slc20a1, Vim</a:t>
+            </a:r>
+            <a:endParaRPr lang="en-US" sz="1200" dirty="0"/>
+          </a:p>
+        </p:txBody>
+      </p:sp>
+      <p:sp>
+        <p:nvSpPr>
+          <p:cNvPr id="7" name="Rectangle 6"/>
+          <p:cNvSpPr/>
+          <p:nvPr/>
+        </p:nvSpPr>
+        <p:spPr>
+          <a:xfrm>
+            <a:off x="4364580" y="1421266"/>
+            <a:ext cx="4572000" cy="461665"/>
+          </a:xfrm>
+          <a:prstGeom prst="rect">
+            <a:avLst/>
+          </a:prstGeom>
+        </p:spPr>
+        <p:txBody>
+          <a:bodyPr>
+            <a:spAutoFit/>
+          </a:bodyPr>
+          <a:lstStyle/>
+          <a:p>
+            <a:r>
+              <a:rPr lang="de-DE" sz="1200" dirty="0" smtClean="0">
+                <a:solidFill>
+                  <a:srgbClr val="FF0000"/>
+                </a:solidFill>
+              </a:rPr>
+              <a:t>TFH </a:t>
+            </a:r>
+            <a:r>
+              <a:rPr lang="de-DE" sz="1200" dirty="0" err="1" smtClean="0">
+                <a:solidFill>
+                  <a:srgbClr val="FF0000"/>
+                </a:solidFill>
+              </a:rPr>
+              <a:t>and</a:t>
+            </a:r>
+            <a:r>
+              <a:rPr lang="de-DE" sz="1200" dirty="0" smtClean="0">
+                <a:solidFill>
+                  <a:srgbClr val="FF0000"/>
+                </a:solidFill>
+              </a:rPr>
+              <a:t> NP </a:t>
+            </a:r>
+            <a:r>
+              <a:rPr lang="de-DE" sz="1200" dirty="0" err="1" smtClean="0">
+                <a:solidFill>
+                  <a:srgbClr val="FF0000"/>
+                </a:solidFill>
+              </a:rPr>
+              <a:t>overlaps</a:t>
+            </a:r>
+            <a:endParaRPr lang="de-DE" sz="1200" dirty="0" smtClean="0">
+              <a:solidFill>
+                <a:srgbClr val="FF0000"/>
+              </a:solidFill>
+            </a:endParaRPr>
+          </a:p>
+          <a:p>
+            <a:r>
+              <a:rPr lang="de-DE" sz="1200" dirty="0" smtClean="0"/>
+              <a:t>Cnr2, Ei24, Ikzf2, Klrb1c, </a:t>
+            </a:r>
+            <a:r>
+              <a:rPr lang="de-DE" sz="1200" dirty="0" err="1" smtClean="0"/>
+              <a:t>Lpxn</a:t>
+            </a:r>
+            <a:r>
+              <a:rPr lang="de-DE" sz="1200" dirty="0" smtClean="0"/>
+              <a:t>, Slc26a2, Smad3, Tnfsf14</a:t>
+            </a:r>
+            <a:endParaRPr lang="en-US" sz="1200" dirty="0"/>
+          </a:p>
+        </p:txBody>
+      </p:sp>
+    </p:spTree>
+    <p:extLst>
+      <p:ext uri="{BB962C8B-B14F-4D97-AF65-F5344CB8AC3E}">
+        <p14:creationId xmlns:p14="http://schemas.microsoft.com/office/powerpoint/2010/main" val="133653637"/>
+      </p:ext>
+    </p:extLst>
+  </p:cSld>
+  <p:clrMapOvr>
+    <a:masterClrMapping/>
+  </p:clrMapOvr>
+</p:sld>
+</file>
+
+<file path=ppt/slides/slide11.xml><?xml version="1.0" encoding="utf-8"?>
+<p:sld xmlns:a="http://schemas.openxmlformats.org/drawingml/2006/main" xmlns:r="http://schemas.openxmlformats.org/officeDocument/2006/relationships" xmlns:p="http://schemas.openxmlformats.org/presentationml/2006/main">
+  <p:cSld>
+    <p:spTree>
+      <p:nvGrpSpPr>
+        <p:cNvPr id="1" name=""/>
+        <p:cNvGrpSpPr/>
+        <p:nvPr/>
+      </p:nvGrpSpPr>
+      <p:grpSpPr>
+        <a:xfrm>
+          <a:off x="0" y="0"/>
+          <a:ext cx="0" cy="0"/>
+          <a:chOff x="0" y="0"/>
+          <a:chExt cx="0" cy="0"/>
+        </a:xfrm>
+      </p:grpSpPr>
+      <p:pic>
+        <p:nvPicPr>
+          <p:cNvPr id="3" name="Picture 2" descr="Screen Shot 2016-01-12 at 4.14.58 PM.png"/>
+          <p:cNvPicPr>
+            <a:picLocks noChangeAspect="1"/>
+          </p:cNvPicPr>
+          <p:nvPr/>
+        </p:nvPicPr>
+        <p:blipFill rotWithShape="1">
+          <a:blip r:embed="rId2">
+            <a:extLst>
+              <a:ext uri="{28A0092B-C50C-407E-A947-70E740481C1C}">
+                <a14:useLocalDpi xmlns:a14="http://schemas.microsoft.com/office/drawing/2010/main" val="0"/>
+              </a:ext>
+            </a:extLst>
+          </a:blip>
+          <a:srcRect l="1361"/>
+          <a:stretch/>
+        </p:blipFill>
+        <p:spPr>
+          <a:xfrm>
+            <a:off x="663880" y="928539"/>
+            <a:ext cx="8392092" cy="1108354"/>
+          </a:xfrm>
+          <a:prstGeom prst="rect">
+            <a:avLst/>
+          </a:prstGeom>
+        </p:spPr>
+      </p:pic>
+      <p:pic>
+        <p:nvPicPr>
+          <p:cNvPr id="4" name="Picture 3" descr="Screen Shot 2016-01-12 at 4.15.18 PM.png"/>
+          <p:cNvPicPr>
+            <a:picLocks noChangeAspect="1"/>
+          </p:cNvPicPr>
+          <p:nvPr/>
+        </p:nvPicPr>
+        <p:blipFill>
+          <a:blip r:embed="rId3">
+            <a:extLst>
+              <a:ext uri="{28A0092B-C50C-407E-A947-70E740481C1C}">
+                <a14:useLocalDpi xmlns:a14="http://schemas.microsoft.com/office/drawing/2010/main" val="0"/>
+              </a:ext>
+            </a:extLst>
+          </a:blip>
+          <a:stretch>
+            <a:fillRect/>
+          </a:stretch>
+        </p:blipFill>
+        <p:spPr>
+          <a:xfrm>
+            <a:off x="663880" y="2952073"/>
+            <a:ext cx="8388678" cy="1291357"/>
+          </a:xfrm>
+          <a:prstGeom prst="rect">
+            <a:avLst/>
+          </a:prstGeom>
+        </p:spPr>
+      </p:pic>
+      <p:sp>
+        <p:nvSpPr>
+          <p:cNvPr id="5" name="Rectangle 4"/>
+          <p:cNvSpPr/>
+          <p:nvPr/>
+        </p:nvSpPr>
+        <p:spPr>
+          <a:xfrm>
+            <a:off x="779339" y="391844"/>
+            <a:ext cx="4572000" cy="276999"/>
+          </a:xfrm>
+          <a:prstGeom prst="rect">
+            <a:avLst/>
+          </a:prstGeom>
+        </p:spPr>
+        <p:txBody>
+          <a:bodyPr>
+            <a:spAutoFit/>
+          </a:bodyPr>
+          <a:lstStyle/>
+          <a:p>
+            <a:r>
+              <a:rPr lang="de-DE" sz="1200" dirty="0" smtClean="0">
+                <a:solidFill>
+                  <a:srgbClr val="FF0000"/>
+                </a:solidFill>
+              </a:rPr>
+              <a:t>TFH </a:t>
+            </a:r>
+            <a:r>
+              <a:rPr lang="de-DE" sz="1200" dirty="0" err="1" smtClean="0">
+                <a:solidFill>
+                  <a:srgbClr val="FF0000"/>
+                </a:solidFill>
+              </a:rPr>
+              <a:t>and</a:t>
+            </a:r>
+            <a:r>
+              <a:rPr lang="de-DE" sz="1200" dirty="0" smtClean="0">
+                <a:solidFill>
+                  <a:srgbClr val="FF0000"/>
+                </a:solidFill>
+              </a:rPr>
+              <a:t> PP </a:t>
+            </a:r>
+            <a:r>
+              <a:rPr lang="de-DE" sz="1200" dirty="0" err="1" smtClean="0">
+                <a:solidFill>
+                  <a:srgbClr val="FF0000"/>
+                </a:solidFill>
+              </a:rPr>
+              <a:t>overlaps</a:t>
+            </a:r>
+            <a:endParaRPr lang="en-US" sz="1200" dirty="0"/>
+          </a:p>
+        </p:txBody>
+      </p:sp>
+      <p:sp>
+        <p:nvSpPr>
+          <p:cNvPr id="6" name="Rectangle 5"/>
+          <p:cNvSpPr/>
+          <p:nvPr/>
+        </p:nvSpPr>
+        <p:spPr>
+          <a:xfrm>
+            <a:off x="779339" y="2410672"/>
+            <a:ext cx="4572000" cy="276999"/>
+          </a:xfrm>
+          <a:prstGeom prst="rect">
+            <a:avLst/>
+          </a:prstGeom>
+        </p:spPr>
+        <p:txBody>
+          <a:bodyPr>
+            <a:spAutoFit/>
+          </a:bodyPr>
+          <a:lstStyle/>
+          <a:p>
+            <a:r>
+              <a:rPr lang="de-DE" sz="1200" dirty="0" smtClean="0">
+                <a:solidFill>
+                  <a:srgbClr val="FF0000"/>
+                </a:solidFill>
+              </a:rPr>
+              <a:t>TH1 </a:t>
+            </a:r>
+            <a:r>
+              <a:rPr lang="de-DE" sz="1200" dirty="0" err="1" smtClean="0">
+                <a:solidFill>
+                  <a:srgbClr val="FF0000"/>
+                </a:solidFill>
+              </a:rPr>
+              <a:t>and</a:t>
+            </a:r>
+            <a:r>
+              <a:rPr lang="de-DE" sz="1200" dirty="0" smtClean="0">
+                <a:solidFill>
+                  <a:srgbClr val="FF0000"/>
+                </a:solidFill>
+              </a:rPr>
+              <a:t> NP </a:t>
+            </a:r>
+            <a:r>
+              <a:rPr lang="de-DE" sz="1200" dirty="0" err="1" smtClean="0">
+                <a:solidFill>
+                  <a:srgbClr val="FF0000"/>
+                </a:solidFill>
+              </a:rPr>
+              <a:t>overlaps</a:t>
+            </a:r>
+            <a:endParaRPr lang="en-US" sz="1200" dirty="0"/>
+          </a:p>
+        </p:txBody>
+      </p:sp>
+    </p:spTree>
+    <p:extLst>
+      <p:ext uri="{BB962C8B-B14F-4D97-AF65-F5344CB8AC3E}">
+        <p14:creationId xmlns:p14="http://schemas.microsoft.com/office/powerpoint/2010/main" val="1088051202"/>
       </p:ext>
     </p:extLst>
   </p:cSld>

</xml_diff>